<commit_message>
Updated lab 9 title
</commit_message>
<xml_diff>
--- a/data8/slides/lab9.pptx
+++ b/data8/slides/lab9.pptx
@@ -7781,7 +7781,13 @@
               <a:rPr lang="en-US" b="1" dirty="0" smtClean="0">
                 <a:latin typeface="Avenir LT Std 45 Book" pitchFamily="34" charset="0"/>
               </a:rPr>
-              <a:t>Skewness, Normality, and Sample Means</a:t>
+              <a:t>The Central Limit Theorem </a:t>
+            </a:r>
+            <a:r>
+              <a:rPr lang="en-US" b="1" dirty="0" smtClean="0">
+                <a:latin typeface="Avenir LT Std 45 Book" pitchFamily="34" charset="0"/>
+              </a:rPr>
+              <a:t>and Sample Means</a:t>
             </a:r>
           </a:p>
           <a:p>

</xml_diff>